<commit_message>
Deploy website Tue Nov 29 17:11:12 PST 2022
</commit_message>
<xml_diff>
--- a/assets/slides/fa22/26-SQL.pptx
+++ b/assets/slides/fa22/26-SQL.pptx
@@ -13424,13 +13424,8 @@
             <a:pPr lvl="1"/>
             <a:r>
               <a:rPr lang="en-US" dirty="0"/>
-              <a:t> think conceptual questions, self-checks, </a:t>
-            </a:r>
-            <a:r>
-              <a:rPr lang="en-US"/>
-              <a:t>environment diagrams, pick the right line of code.</a:t>
-            </a:r>
-            <a:endParaRPr lang="en-US" dirty="0"/>
+              <a:t> think conceptual questions, self-checks, environment diagrams, pick the right line of code.</a:t>
+            </a:r>
           </a:p>
           <a:p>
             <a:r>

</xml_diff>